<commit_message>
Minor updates to intro.pptx & README.  Added RESOURCES.
</commit_message>
<xml_diff>
--- a/presentations/01.1_practicum_intro.pptx
+++ b/presentations/01.1_practicum_intro.pptx
@@ -238,7 +238,7 @@
           <a:p>
             <a:fld id="{FD93C9B2-20F6-4DB1-B471-224337D0AC79}" type="datetimeFigureOut">
               <a:rPr lang="en-US" smtClean="0"/>
-              <a:t>10/21/2022</a:t>
+              <a:t>12/12/2022</a:t>
             </a:fld>
             <a:endParaRPr lang="en-US"/>
           </a:p>
@@ -3558,17 +3558,12 @@
           <a:lstStyle/>
           <a:p>
             <a:r>
+              <a:rPr lang="en-US"/>
+              <a:t>A </a:t>
+            </a:r>
+            <a:r>
               <a:rPr lang="en-US" dirty="0"/>
-              <a:t>Practicum AI is designed for non-technical students in open admission colleges and universities.  </a:t>
-            </a:r>
-          </a:p>
-          <a:p>
-            <a:endParaRPr lang="en-US" dirty="0"/>
-          </a:p>
-          <a:p>
-            <a:r>
-              <a:rPr lang="en-US" dirty="0"/>
-              <a:t>A non-technical student is someone who does not have a strong quantitative background.  </a:t>
+              <a:t>non-technical student is someone who does not have a strong quantitative background.  </a:t>
             </a:r>
           </a:p>
           <a:p>
@@ -4499,7 +4494,7 @@
           <a:p>
             <a:fld id="{C3F78080-8D0A-4BE8-A5B4-CB115102D524}" type="datetimeFigureOut">
               <a:rPr lang="en-US" smtClean="0"/>
-              <a:t>10/21/2022</a:t>
+              <a:t>12/12/2022</a:t>
             </a:fld>
             <a:endParaRPr lang="en-US"/>
           </a:p>
@@ -4697,7 +4692,7 @@
           <a:p>
             <a:fld id="{C3F78080-8D0A-4BE8-A5B4-CB115102D524}" type="datetimeFigureOut">
               <a:rPr lang="en-US" smtClean="0"/>
-              <a:t>10/21/2022</a:t>
+              <a:t>12/12/2022</a:t>
             </a:fld>
             <a:endParaRPr lang="en-US"/>
           </a:p>
@@ -4905,7 +4900,7 @@
           <a:p>
             <a:fld id="{C3F78080-8D0A-4BE8-A5B4-CB115102D524}" type="datetimeFigureOut">
               <a:rPr lang="en-US" smtClean="0"/>
-              <a:t>10/21/2022</a:t>
+              <a:t>12/12/2022</a:t>
             </a:fld>
             <a:endParaRPr lang="en-US"/>
           </a:p>
@@ -5103,7 +5098,7 @@
           <a:p>
             <a:fld id="{C3F78080-8D0A-4BE8-A5B4-CB115102D524}" type="datetimeFigureOut">
               <a:rPr lang="en-US" smtClean="0"/>
-              <a:t>10/21/2022</a:t>
+              <a:t>12/12/2022</a:t>
             </a:fld>
             <a:endParaRPr lang="en-US"/>
           </a:p>
@@ -5378,7 +5373,7 @@
           <a:p>
             <a:fld id="{C3F78080-8D0A-4BE8-A5B4-CB115102D524}" type="datetimeFigureOut">
               <a:rPr lang="en-US" smtClean="0"/>
-              <a:t>10/21/2022</a:t>
+              <a:t>12/12/2022</a:t>
             </a:fld>
             <a:endParaRPr lang="en-US"/>
           </a:p>
@@ -5643,7 +5638,7 @@
           <a:p>
             <a:fld id="{C3F78080-8D0A-4BE8-A5B4-CB115102D524}" type="datetimeFigureOut">
               <a:rPr lang="en-US" smtClean="0"/>
-              <a:t>10/21/2022</a:t>
+              <a:t>12/12/2022</a:t>
             </a:fld>
             <a:endParaRPr lang="en-US"/>
           </a:p>
@@ -6055,7 +6050,7 @@
           <a:p>
             <a:fld id="{C3F78080-8D0A-4BE8-A5B4-CB115102D524}" type="datetimeFigureOut">
               <a:rPr lang="en-US" smtClean="0"/>
-              <a:t>10/21/2022</a:t>
+              <a:t>12/12/2022</a:t>
             </a:fld>
             <a:endParaRPr lang="en-US"/>
           </a:p>
@@ -6196,7 +6191,7 @@
           <a:p>
             <a:fld id="{C3F78080-8D0A-4BE8-A5B4-CB115102D524}" type="datetimeFigureOut">
               <a:rPr lang="en-US" smtClean="0"/>
-              <a:t>10/21/2022</a:t>
+              <a:t>12/12/2022</a:t>
             </a:fld>
             <a:endParaRPr lang="en-US"/>
           </a:p>
@@ -6309,7 +6304,7 @@
           <a:p>
             <a:fld id="{C3F78080-8D0A-4BE8-A5B4-CB115102D524}" type="datetimeFigureOut">
               <a:rPr lang="en-US" smtClean="0"/>
-              <a:t>10/21/2022</a:t>
+              <a:t>12/12/2022</a:t>
             </a:fld>
             <a:endParaRPr lang="en-US"/>
           </a:p>
@@ -6620,7 +6615,7 @@
           <a:p>
             <a:fld id="{C3F78080-8D0A-4BE8-A5B4-CB115102D524}" type="datetimeFigureOut">
               <a:rPr lang="en-US" smtClean="0"/>
-              <a:t>10/21/2022</a:t>
+              <a:t>12/12/2022</a:t>
             </a:fld>
             <a:endParaRPr lang="en-US"/>
           </a:p>
@@ -6908,7 +6903,7 @@
           <a:p>
             <a:fld id="{C3F78080-8D0A-4BE8-A5B4-CB115102D524}" type="datetimeFigureOut">
               <a:rPr lang="en-US" smtClean="0"/>
-              <a:t>10/21/2022</a:t>
+              <a:t>12/12/2022</a:t>
             </a:fld>
             <a:endParaRPr lang="en-US"/>
           </a:p>
@@ -7149,7 +7144,7 @@
           <a:p>
             <a:fld id="{C3F78080-8D0A-4BE8-A5B4-CB115102D524}" type="datetimeFigureOut">
               <a:rPr lang="en-US" smtClean="0"/>
-              <a:t>10/21/2022</a:t>
+              <a:t>12/12/2022</a:t>
             </a:fld>
             <a:endParaRPr lang="en-US"/>
           </a:p>
@@ -13895,31 +13890,6 @@
       </p:grpSpPr>
       <p:sp>
         <p:nvSpPr>
-          <p:cNvPr id="2" name="Title 1">
-            <a:extLst>
-              <a:ext uri="{FF2B5EF4-FFF2-40B4-BE49-F238E27FC236}">
-                <a16:creationId xmlns:a16="http://schemas.microsoft.com/office/drawing/2014/main" id="{F3FF74A9-72AA-761E-3A6B-EA37DD5EFEEC}"/>
-              </a:ext>
-            </a:extLst>
-          </p:cNvPr>
-          <p:cNvSpPr>
-            <a:spLocks noGrp="1"/>
-          </p:cNvSpPr>
-          <p:nvPr>
-            <p:ph type="title"/>
-          </p:nvPr>
-        </p:nvSpPr>
-        <p:spPr/>
-        <p:txBody>
-          <a:bodyPr/>
-          <a:lstStyle/>
-          <a:p>
-            <a:endParaRPr lang="en-US" dirty="0"/>
-          </a:p>
-        </p:txBody>
-      </p:sp>
-      <p:sp>
-        <p:nvSpPr>
           <p:cNvPr id="4" name="Content Placeholder 11">
             <a:extLst>
               <a:ext uri="{FF2B5EF4-FFF2-40B4-BE49-F238E27FC236}">
@@ -13936,8 +13906,8 @@
         </p:nvSpPr>
         <p:spPr>
           <a:xfrm>
-            <a:off x="565245" y="2059969"/>
-            <a:ext cx="11061510" cy="2738061"/>
+            <a:off x="0" y="2766218"/>
+            <a:ext cx="12171452" cy="1325563"/>
           </a:xfrm>
         </p:spPr>
         <p:txBody>
@@ -13971,22 +13941,7 @@
               <a:rPr lang="en-US" sz="3600" dirty="0">
                 <a:latin typeface="Avenir Next LT Pro" panose="020B0504020202020204" pitchFamily="34" charset="0"/>
               </a:rPr>
-              <a:t> students at </a:t>
-            </a:r>
-            <a:r>
-              <a:rPr lang="en-US" sz="3600" dirty="0">
-                <a:solidFill>
-                  <a:srgbClr val="6AB07B"/>
-                </a:solidFill>
-                <a:latin typeface="Avenir Next LT Pro" panose="020B0504020202020204" pitchFamily="34" charset="0"/>
-              </a:rPr>
-              <a:t>open admission </a:t>
-            </a:r>
-            <a:r>
-              <a:rPr lang="en-US" sz="3600" dirty="0">
-                <a:latin typeface="Avenir Next LT Pro" panose="020B0504020202020204" pitchFamily="34" charset="0"/>
-              </a:rPr>
-              <a:t>colleges and universities</a:t>
+              <a:t> students </a:t>
             </a:r>
           </a:p>
         </p:txBody>

</xml_diff>